<commit_message>
links adicionados nos arquivos do projeto
Atualizei os links para direcionamento
</commit_message>
<xml_diff>
--- a/files/CSS HERO v2.pptx
+++ b/files/CSS HERO v2.pptx
@@ -7030,6 +7030,106 @@
           </a:p>
         </p:txBody>
       </p:sp>
+      <p:sp>
+        <p:nvSpPr>
+          <p:cNvPr id="8" name="Retângulo 7">
+            <a:hlinkClick r:id="rId8"/>
+            <a:extLst>
+              <a:ext uri="{FF2B5EF4-FFF2-40B4-BE49-F238E27FC236}">
+                <a16:creationId xmlns:a16="http://schemas.microsoft.com/office/drawing/2014/main" id="{F3855FF1-F016-B51C-F4C8-882877230007}"/>
+              </a:ext>
+            </a:extLst>
+          </p:cNvPr>
+          <p:cNvSpPr/>
+          <p:nvPr/>
+        </p:nvSpPr>
+        <p:spPr>
+          <a:xfrm>
+            <a:off x="1978376" y="6771125"/>
+            <a:ext cx="5750170" cy="544318"/>
+          </a:xfrm>
+          <a:prstGeom prst="rect">
+            <a:avLst/>
+          </a:prstGeom>
+          <a:solidFill>
+            <a:schemeClr val="bg1"/>
+          </a:solidFill>
+          <a:ln>
+            <a:noFill/>
+          </a:ln>
+        </p:spPr>
+        <p:style>
+          <a:lnRef idx="2">
+            <a:schemeClr val="accent1">
+              <a:shade val="15000"/>
+            </a:schemeClr>
+          </a:lnRef>
+          <a:fillRef idx="1">
+            <a:schemeClr val="accent1"/>
+          </a:fillRef>
+          <a:effectRef idx="0">
+            <a:schemeClr val="accent1"/>
+          </a:effectRef>
+          <a:fontRef idx="minor">
+            <a:schemeClr val="lt1"/>
+          </a:fontRef>
+        </p:style>
+        <p:txBody>
+          <a:bodyPr rtlCol="0" anchor="ctr"/>
+          <a:lstStyle/>
+          <a:p>
+            <a:pPr algn="ctr"/>
+            <a:r>
+              <a:rPr lang="pt-BR" dirty="0">
+                <a:ln>
+                  <a:solidFill>
+                    <a:srgbClr val="0070C0"/>
+                  </a:solidFill>
+                </a:ln>
+                <a:latin typeface="Calibri Light" panose="020F0302020204030204" pitchFamily="34" charset="0"/>
+                <a:cs typeface="Calibri Light" panose="020F0302020204030204" pitchFamily="34" charset="0"/>
+              </a:rPr>
+              <a:t>https://github.com/wakesantos/projeto_ebook_com_ias/</a:t>
+            </a:r>
+          </a:p>
+        </p:txBody>
+      </p:sp>
+      <p:pic>
+        <p:nvPicPr>
+          <p:cNvPr id="23" name="Imagem 22" descr="Forma&#10;&#10;O conteúdo gerado por IA pode estar incorreto.">
+            <a:extLst>
+              <a:ext uri="{FF2B5EF4-FFF2-40B4-BE49-F238E27FC236}">
+                <a16:creationId xmlns:a16="http://schemas.microsoft.com/office/drawing/2014/main" id="{8D02006B-EAAE-4705-9C59-1983CC7720EF}"/>
+              </a:ext>
+            </a:extLst>
+          </p:cNvPr>
+          <p:cNvPicPr>
+            <a:picLocks noChangeAspect="1"/>
+          </p:cNvPicPr>
+          <p:nvPr/>
+        </p:nvPicPr>
+        <p:blipFill>
+          <a:blip r:embed="rId5">
+            <a:extLst>
+              <a:ext uri="{28A0092B-C50C-407E-A947-70E740481C1C}">
+                <a14:useLocalDpi xmlns:a14="http://schemas.microsoft.com/office/drawing/2010/main" val="0"/>
+              </a:ext>
+            </a:extLst>
+          </a:blip>
+          <a:stretch>
+            <a:fillRect/>
+          </a:stretch>
+        </p:blipFill>
+        <p:spPr>
+          <a:xfrm>
+            <a:off x="4480331" y="6296208"/>
+            <a:ext cx="600279" cy="600279"/>
+          </a:xfrm>
+          <a:prstGeom prst="rect">
+            <a:avLst/>
+          </a:prstGeom>
+        </p:spPr>
+      </p:pic>
     </p:spTree>
     <p:extLst>
       <p:ext uri="{BB962C8B-B14F-4D97-AF65-F5344CB8AC3E}">

</xml_diff>